<commit_message>
Update S2. More Python PP
</commit_message>
<xml_diff>
--- a/Programming 4/Week 11/S2. More Python.pptx
+++ b/Programming 4/Week 11/S2. More Python.pptx
@@ -219,7 +219,7 @@
           <a:p>
             <a:fld id="{5C15C721-1CBE-9B49-BE99-3A9DF18FA391}" type="datetimeFigureOut">
               <a:rPr lang="en-US" smtClean="0"/>
-              <a:t>5/17/19</a:t>
+              <a:t>5/24/19</a:t>
             </a:fld>
             <a:endParaRPr lang="en-US"/>
           </a:p>
@@ -2337,7 +2337,7 @@
           <a:p>
             <a:fld id="{BD4CA122-8521-6D44-9B67-558DC60F8753}" type="datetimeFigureOut">
               <a:rPr lang="en-US" smtClean="0"/>
-              <a:t>5/17/19</a:t>
+              <a:t>5/24/19</a:t>
             </a:fld>
             <a:endParaRPr lang="en-US"/>
           </a:p>
@@ -2507,7 +2507,7 @@
           <a:p>
             <a:fld id="{BD4CA122-8521-6D44-9B67-558DC60F8753}" type="datetimeFigureOut">
               <a:rPr lang="en-US" smtClean="0"/>
-              <a:t>5/17/19</a:t>
+              <a:t>5/24/19</a:t>
             </a:fld>
             <a:endParaRPr lang="en-US"/>
           </a:p>
@@ -2687,7 +2687,7 @@
           <a:p>
             <a:fld id="{BD4CA122-8521-6D44-9B67-558DC60F8753}" type="datetimeFigureOut">
               <a:rPr lang="en-US" smtClean="0"/>
-              <a:t>5/17/19</a:t>
+              <a:t>5/24/19</a:t>
             </a:fld>
             <a:endParaRPr lang="en-US"/>
           </a:p>
@@ -2857,7 +2857,7 @@
           <a:p>
             <a:fld id="{BD4CA122-8521-6D44-9B67-558DC60F8753}" type="datetimeFigureOut">
               <a:rPr lang="en-US" smtClean="0"/>
-              <a:t>5/17/19</a:t>
+              <a:t>5/24/19</a:t>
             </a:fld>
             <a:endParaRPr lang="en-US"/>
           </a:p>
@@ -3103,7 +3103,7 @@
           <a:p>
             <a:fld id="{BD4CA122-8521-6D44-9B67-558DC60F8753}" type="datetimeFigureOut">
               <a:rPr lang="en-US" smtClean="0"/>
-              <a:t>5/17/19</a:t>
+              <a:t>5/24/19</a:t>
             </a:fld>
             <a:endParaRPr lang="en-US"/>
           </a:p>
@@ -3335,7 +3335,7 @@
           <a:p>
             <a:fld id="{BD4CA122-8521-6D44-9B67-558DC60F8753}" type="datetimeFigureOut">
               <a:rPr lang="en-US" smtClean="0"/>
-              <a:t>5/17/19</a:t>
+              <a:t>5/24/19</a:t>
             </a:fld>
             <a:endParaRPr lang="en-US"/>
           </a:p>
@@ -3702,7 +3702,7 @@
           <a:p>
             <a:fld id="{BD4CA122-8521-6D44-9B67-558DC60F8753}" type="datetimeFigureOut">
               <a:rPr lang="en-US" smtClean="0"/>
-              <a:t>5/17/19</a:t>
+              <a:t>5/24/19</a:t>
             </a:fld>
             <a:endParaRPr lang="en-US"/>
           </a:p>
@@ -3820,7 +3820,7 @@
           <a:p>
             <a:fld id="{BD4CA122-8521-6D44-9B67-558DC60F8753}" type="datetimeFigureOut">
               <a:rPr lang="en-US" smtClean="0"/>
-              <a:t>5/17/19</a:t>
+              <a:t>5/24/19</a:t>
             </a:fld>
             <a:endParaRPr lang="en-US"/>
           </a:p>
@@ -3915,7 +3915,7 @@
           <a:p>
             <a:fld id="{BD4CA122-8521-6D44-9B67-558DC60F8753}" type="datetimeFigureOut">
               <a:rPr lang="en-US" smtClean="0"/>
-              <a:t>5/17/19</a:t>
+              <a:t>5/24/19</a:t>
             </a:fld>
             <a:endParaRPr lang="en-US"/>
           </a:p>
@@ -4192,7 +4192,7 @@
           <a:p>
             <a:fld id="{BD4CA122-8521-6D44-9B67-558DC60F8753}" type="datetimeFigureOut">
               <a:rPr lang="en-US" smtClean="0"/>
-              <a:t>5/17/19</a:t>
+              <a:t>5/24/19</a:t>
             </a:fld>
             <a:endParaRPr lang="en-US"/>
           </a:p>
@@ -4445,7 +4445,7 @@
           <a:p>
             <a:fld id="{BD4CA122-8521-6D44-9B67-558DC60F8753}" type="datetimeFigureOut">
               <a:rPr lang="en-US" smtClean="0"/>
-              <a:t>5/17/19</a:t>
+              <a:t>5/24/19</a:t>
             </a:fld>
             <a:endParaRPr lang="en-US"/>
           </a:p>
@@ -4658,7 +4658,7 @@
           <a:p>
             <a:fld id="{BD4CA122-8521-6D44-9B67-558DC60F8753}" type="datetimeFigureOut">
               <a:rPr lang="en-US" smtClean="0"/>
-              <a:t>5/17/19</a:t>
+              <a:t>5/24/19</a:t>
             </a:fld>
             <a:endParaRPr lang="en-US"/>
           </a:p>
@@ -5128,7 +5128,6 @@
               <a:rPr lang="en-US" sz="3800" b="1" dirty="0" smtClean="0"/>
               <a:t>More Python</a:t>
             </a:r>
-            <a:endParaRPr lang="en-US" sz="3800" b="1" dirty="0" smtClean="0"/>
           </a:p>
           <a:p>
             <a:pPr algn="ctr"/>
@@ -5332,7 +5331,15 @@
             </a:pPr>
             <a:r>
               <a:rPr lang="en-AU" sz="2500" dirty="0" smtClean="0"/>
-              <a:t>If created outside of the class, they are static</a:t>
+              <a:t>If created outside </a:t>
+            </a:r>
+            <a:r>
+              <a:rPr lang="en-AU" sz="2500" dirty="0" smtClean="0"/>
+              <a:t>any method, </a:t>
+            </a:r>
+            <a:r>
+              <a:rPr lang="en-AU" sz="2500" dirty="0" smtClean="0"/>
+              <a:t>they are static</a:t>
             </a:r>
           </a:p>
           <a:p>
@@ -5342,7 +5349,15 @@
             </a:pPr>
             <a:r>
               <a:rPr lang="en-AU" sz="2500" dirty="0" smtClean="0"/>
-              <a:t>If created inside of the class, they are local</a:t>
+              <a:t>If created inside </a:t>
+            </a:r>
+            <a:r>
+              <a:rPr lang="en-AU" sz="2500" dirty="0" smtClean="0"/>
+              <a:t>a method without prefix, </a:t>
+            </a:r>
+            <a:r>
+              <a:rPr lang="en-AU" sz="2500" dirty="0" smtClean="0"/>
+              <a:t>they are local</a:t>
             </a:r>
           </a:p>
           <a:p>
@@ -5352,8 +5367,21 @@
             </a:pPr>
             <a:r>
               <a:rPr lang="en-AU" sz="2500" dirty="0" smtClean="0"/>
-              <a:t>If created inside of the method, they are prefixed with self</a:t>
-            </a:r>
+              <a:t>If created inside </a:t>
+            </a:r>
+            <a:r>
+              <a:rPr lang="en-AU" sz="2500" dirty="0"/>
+              <a:t>a</a:t>
+            </a:r>
+            <a:r>
+              <a:rPr lang="en-AU" sz="2500" dirty="0" smtClean="0"/>
+              <a:t> method and prefaced with self, they are </a:t>
+            </a:r>
+            <a:r>
+              <a:rPr lang="en-AU" sz="2500" smtClean="0"/>
+              <a:t>data members</a:t>
+            </a:r>
+            <a:endParaRPr lang="en-AU" sz="2500" dirty="0" smtClean="0"/>
           </a:p>
         </p:txBody>
       </p:sp>
@@ -5697,7 +5725,6 @@
               <a:rPr lang="en-US" sz="3800" b="1" dirty="0" smtClean="0"/>
               <a:t>Sequences</a:t>
             </a:r>
-            <a:endParaRPr lang="en-US" sz="3800" b="1" dirty="0" smtClean="0"/>
           </a:p>
           <a:p>
             <a:endParaRPr lang="en-US" sz="3800" b="1" dirty="0"/>
@@ -5900,7 +5927,6 @@
               <a:rPr lang="en-US" sz="3800" b="1" dirty="0" smtClean="0"/>
               <a:t>Slicing</a:t>
             </a:r>
-            <a:endParaRPr lang="en-US" sz="3800" b="1" dirty="0" smtClean="0"/>
           </a:p>
           <a:p>
             <a:endParaRPr lang="en-US" sz="3800" b="1" dirty="0"/>
@@ -6148,7 +6174,6 @@
               <a:rPr lang="en-US" sz="3800" b="1" dirty="0" smtClean="0"/>
               <a:t>Omitting an index</a:t>
             </a:r>
-            <a:endParaRPr lang="en-US" sz="3800" b="1" dirty="0" smtClean="0"/>
           </a:p>
           <a:p>
             <a:endParaRPr lang="en-US" sz="3800" b="1" dirty="0"/>
@@ -6333,7 +6358,6 @@
               <a:rPr lang="en-US" sz="3800" b="1" dirty="0" smtClean="0"/>
               <a:t>Step</a:t>
             </a:r>
-            <a:endParaRPr lang="en-US" sz="3800" b="1" dirty="0" smtClean="0"/>
           </a:p>
           <a:p>
             <a:endParaRPr lang="en-US" sz="3800" b="1" dirty="0"/>
@@ -6569,7 +6593,6 @@
               <a:rPr lang="en-US" sz="3800" b="1" dirty="0" smtClean="0"/>
               <a:t>Sequence types</a:t>
             </a:r>
-            <a:endParaRPr lang="en-US" sz="3800" b="1" dirty="0" smtClean="0"/>
           </a:p>
           <a:p>
             <a:endParaRPr lang="en-US" sz="3800" b="1" dirty="0"/>
@@ -6791,7 +6814,6 @@
               <a:rPr lang="en-US" sz="3800" b="1" dirty="0" smtClean="0"/>
               <a:t>Lists</a:t>
             </a:r>
-            <a:endParaRPr lang="en-US" sz="3800" b="1" dirty="0" smtClean="0"/>
           </a:p>
           <a:p>
             <a:endParaRPr lang="en-US" sz="3800" b="1" dirty="0"/>
@@ -7062,7 +7084,6 @@
               <a:rPr lang="en-US" sz="3800" b="1" dirty="0" smtClean="0"/>
               <a:t>Tuples</a:t>
             </a:r>
-            <a:endParaRPr lang="en-US" sz="3800" b="1" dirty="0" smtClean="0"/>
           </a:p>
           <a:p>
             <a:endParaRPr lang="en-US" sz="3800" b="1" dirty="0"/>

</xml_diff>

<commit_message>
Update Week 12 PPs
</commit_message>
<xml_diff>
--- a/Programming 4/Week 11/S2. More Python.pptx
+++ b/Programming 4/Week 11/S2. More Python.pptx
@@ -5231,7 +5231,7 @@
         <p:spPr>
           <a:xfrm>
             <a:off x="0" y="1299607"/>
-            <a:ext cx="12192000" cy="4724370"/>
+            <a:ext cx="12192000" cy="5109091"/>
           </a:xfrm>
           <a:prstGeom prst="rect">
             <a:avLst/>
@@ -5331,15 +5331,7 @@
             </a:pPr>
             <a:r>
               <a:rPr lang="en-AU" sz="2500" dirty="0" smtClean="0"/>
-              <a:t>If created outside </a:t>
-            </a:r>
-            <a:r>
-              <a:rPr lang="en-AU" sz="2500" dirty="0" smtClean="0"/>
-              <a:t>any method, </a:t>
-            </a:r>
-            <a:r>
-              <a:rPr lang="en-AU" sz="2500" dirty="0" smtClean="0"/>
-              <a:t>they are static</a:t>
+              <a:t>If created outside any method, they are static</a:t>
             </a:r>
           </a:p>
           <a:p>
@@ -5349,16 +5341,13 @@
             </a:pPr>
             <a:r>
               <a:rPr lang="en-AU" sz="2500" dirty="0" smtClean="0"/>
-              <a:t>If created inside </a:t>
+              <a:t>If created inside a method without prefix, they are </a:t>
             </a:r>
             <a:r>
               <a:rPr lang="en-AU" sz="2500" dirty="0" smtClean="0"/>
-              <a:t>a method without prefix, </a:t>
-            </a:r>
-            <a:r>
-              <a:rPr lang="en-AU" sz="2500" dirty="0" smtClean="0"/>
-              <a:t>they are local</a:t>
-            </a:r>
+              <a:t>local to the method</a:t>
+            </a:r>
+            <a:endParaRPr lang="en-AU" sz="2500" dirty="0" smtClean="0"/>
           </a:p>
           <a:p>
             <a:pPr marL="1943100" lvl="3" indent="-571500">
@@ -5367,7 +5356,11 @@
             </a:pPr>
             <a:r>
               <a:rPr lang="en-AU" sz="2500" dirty="0" smtClean="0"/>
-              <a:t>If created inside </a:t>
+              <a:t>If </a:t>
+            </a:r>
+            <a:r>
+              <a:rPr lang="en-AU" sz="2500" dirty="0" smtClean="0"/>
+              <a:t>declared inside </a:t>
             </a:r>
             <a:r>
               <a:rPr lang="en-AU" sz="2500" dirty="0"/>
@@ -5375,13 +5368,16 @@
             </a:r>
             <a:r>
               <a:rPr lang="en-AU" sz="2500" dirty="0" smtClean="0"/>
-              <a:t> method and prefaced with self, they are </a:t>
-            </a:r>
-            <a:r>
-              <a:rPr lang="en-AU" sz="2500" smtClean="0"/>
+              <a:t> method and prefaced with self, they </a:t>
+            </a:r>
+            <a:r>
+              <a:rPr lang="en-AU" sz="2500" dirty="0" smtClean="0"/>
+              <a:t>are class </a:t>
+            </a:r>
+            <a:r>
+              <a:rPr lang="en-AU" sz="2500" dirty="0" smtClean="0"/>
               <a:t>data members</a:t>
             </a:r>
-            <a:endParaRPr lang="en-AU" sz="2500" dirty="0" smtClean="0"/>
           </a:p>
         </p:txBody>
       </p:sp>

</xml_diff>